<commit_message>
add 2 files and edit slide
edit slide for Sendai.R
</commit_message>
<xml_diff>
--- a/Rによる多母集団IRT.pptx
+++ b/Rによる多母集団IRT.pptx
@@ -108,6 +108,11 @@
       </a:defRPr>
     </a:lvl9pPr>
   </p:defaultTextStyle>
+  <p:extLst>
+    <p:ext uri="{EFAFB233-063F-42B5-8137-9DF3F51BA10A}">
+      <p15:sldGuideLst xmlns:p15="http://schemas.microsoft.com/office/powerpoint/2012/main"/>
+    </p:ext>
+  </p:extLst>
 </p:presentation>
 </file>
 
@@ -242,7 +247,7 @@
           <a:p>
             <a:fld id="{9D8B4E46-235A-4FA0-A938-E715329C88B4}" type="datetimeFigureOut">
               <a:rPr kumimoji="1" lang="ja-JP" altLang="en-US" smtClean="0"/>
-              <a:t>2019/4/10</a:t>
+              <a:t>2019/4/11</a:t>
             </a:fld>
             <a:endParaRPr kumimoji="1" lang="ja-JP" altLang="en-US"/>
           </a:p>
@@ -444,7 +449,7 @@
           <a:p>
             <a:fld id="{9D8B4E46-235A-4FA0-A938-E715329C88B4}" type="datetimeFigureOut">
               <a:rPr kumimoji="1" lang="ja-JP" altLang="en-US" smtClean="0"/>
-              <a:t>2019/4/10</a:t>
+              <a:t>2019/4/11</a:t>
             </a:fld>
             <a:endParaRPr kumimoji="1" lang="ja-JP" altLang="en-US"/>
           </a:p>
@@ -656,7 +661,7 @@
           <a:p>
             <a:fld id="{9D8B4E46-235A-4FA0-A938-E715329C88B4}" type="datetimeFigureOut">
               <a:rPr kumimoji="1" lang="ja-JP" altLang="en-US" smtClean="0"/>
-              <a:t>2019/4/10</a:t>
+              <a:t>2019/4/11</a:t>
             </a:fld>
             <a:endParaRPr kumimoji="1" lang="ja-JP" altLang="en-US"/>
           </a:p>
@@ -868,7 +873,7 @@
           <a:p>
             <a:fld id="{9D8B4E46-235A-4FA0-A938-E715329C88B4}" type="datetimeFigureOut">
               <a:rPr kumimoji="1" lang="ja-JP" altLang="en-US" smtClean="0"/>
-              <a:t>2019/4/10</a:t>
+              <a:t>2019/4/11</a:t>
             </a:fld>
             <a:endParaRPr kumimoji="1" lang="ja-JP" altLang="en-US"/>
           </a:p>
@@ -1112,7 +1117,7 @@
           <a:p>
             <a:fld id="{9D8B4E46-235A-4FA0-A938-E715329C88B4}" type="datetimeFigureOut">
               <a:rPr kumimoji="1" lang="ja-JP" altLang="en-US" smtClean="0"/>
-              <a:t>2019/4/10</a:t>
+              <a:t>2019/4/11</a:t>
             </a:fld>
             <a:endParaRPr kumimoji="1" lang="ja-JP" altLang="en-US"/>
           </a:p>
@@ -1408,7 +1413,7 @@
           <a:p>
             <a:fld id="{9D8B4E46-235A-4FA0-A938-E715329C88B4}" type="datetimeFigureOut">
               <a:rPr kumimoji="1" lang="ja-JP" altLang="en-US" smtClean="0"/>
-              <a:t>2019/4/10</a:t>
+              <a:t>2019/4/11</a:t>
             </a:fld>
             <a:endParaRPr kumimoji="1" lang="ja-JP" altLang="en-US"/>
           </a:p>
@@ -1839,7 +1844,7 @@
           <a:p>
             <a:fld id="{9D8B4E46-235A-4FA0-A938-E715329C88B4}" type="datetimeFigureOut">
               <a:rPr kumimoji="1" lang="ja-JP" altLang="en-US" smtClean="0"/>
-              <a:t>2019/4/10</a:t>
+              <a:t>2019/4/11</a:t>
             </a:fld>
             <a:endParaRPr kumimoji="1" lang="ja-JP" altLang="en-US"/>
           </a:p>
@@ -1957,7 +1962,7 @@
           <a:p>
             <a:fld id="{9D8B4E46-235A-4FA0-A938-E715329C88B4}" type="datetimeFigureOut">
               <a:rPr kumimoji="1" lang="ja-JP" altLang="en-US" smtClean="0"/>
-              <a:t>2019/4/10</a:t>
+              <a:t>2019/4/11</a:t>
             </a:fld>
             <a:endParaRPr kumimoji="1" lang="ja-JP" altLang="en-US"/>
           </a:p>
@@ -2052,7 +2057,7 @@
           <a:p>
             <a:fld id="{9D8B4E46-235A-4FA0-A938-E715329C88B4}" type="datetimeFigureOut">
               <a:rPr kumimoji="1" lang="ja-JP" altLang="en-US" smtClean="0"/>
-              <a:t>2019/4/10</a:t>
+              <a:t>2019/4/11</a:t>
             </a:fld>
             <a:endParaRPr kumimoji="1" lang="ja-JP" altLang="en-US"/>
           </a:p>
@@ -2361,7 +2366,7 @@
           <a:p>
             <a:fld id="{9D8B4E46-235A-4FA0-A938-E715329C88B4}" type="datetimeFigureOut">
               <a:rPr kumimoji="1" lang="ja-JP" altLang="en-US" smtClean="0"/>
-              <a:t>2019/4/10</a:t>
+              <a:t>2019/4/11</a:t>
             </a:fld>
             <a:endParaRPr kumimoji="1" lang="ja-JP" altLang="en-US"/>
           </a:p>
@@ -2618,7 +2623,7 @@
           <a:p>
             <a:fld id="{9D8B4E46-235A-4FA0-A938-E715329C88B4}" type="datetimeFigureOut">
               <a:rPr kumimoji="1" lang="ja-JP" altLang="en-US" smtClean="0"/>
-              <a:t>2019/4/10</a:t>
+              <a:t>2019/4/11</a:t>
             </a:fld>
             <a:endParaRPr kumimoji="1" lang="ja-JP" altLang="en-US"/>
           </a:p>
@@ -2918,7 +2923,7 @@
           <a:p>
             <a:fld id="{9D8B4E46-235A-4FA0-A938-E715329C88B4}" type="datetimeFigureOut">
               <a:rPr kumimoji="1" lang="ja-JP" altLang="en-US" smtClean="0"/>
-              <a:t>2019/4/10</a:t>
+              <a:t>2019/4/11</a:t>
             </a:fld>
             <a:endParaRPr kumimoji="1" lang="ja-JP" altLang="en-US"/>
           </a:p>
@@ -3581,8 +3586,15 @@
             </a:r>
             <a:r>
               <a:rPr kumimoji="1" lang="ja-JP" altLang="en-US" dirty="0"/>
-              <a:t>による項目反応理論　オーム社</a:t>
-            </a:r>
+              <a:t>による項目反応理論</a:t>
+            </a:r>
+            <a:r>
+              <a:rPr kumimoji="1" lang="ja-JP" altLang="en-US"/>
+              <a:t>　オーム社</a:t>
+            </a:r>
+            <a:endParaRPr kumimoji="1" lang="en-US" altLang="ja-JP" dirty="0"/>
+          </a:p>
+          <a:p>
             <a:endParaRPr kumimoji="1" lang="en-US" altLang="ja-JP" dirty="0"/>
           </a:p>
           <a:p>
@@ -3592,33 +3604,85 @@
               <a:t>（おそらく）日本で一番</a:t>
             </a:r>
             <a:r>
+              <a:rPr kumimoji="1" lang="en-US" altLang="ja-JP" sz="2800" b="1" dirty="0"/>
+              <a:t>IRT</a:t>
+            </a:r>
+            <a:r>
+              <a:rPr kumimoji="1" lang="ja-JP" altLang="en-US" sz="2800" b="1" dirty="0"/>
+              <a:t>の実践</a:t>
+            </a:r>
+            <a:r>
+              <a:rPr kumimoji="1" lang="ja-JP" altLang="en-US" dirty="0"/>
+              <a:t>に精通している著者による</a:t>
+            </a:r>
+            <a:r>
+              <a:rPr kumimoji="1" lang="ja-JP" altLang="en-US" sz="2800" b="1" dirty="0">
+                <a:solidFill>
+                  <a:srgbClr val="C00000"/>
+                </a:solidFill>
+              </a:rPr>
+              <a:t>項目反応</a:t>
+            </a:r>
+            <a:r>
+              <a:rPr kumimoji="1" lang="ja-JP" altLang="en-US" sz="2800" b="1">
+                <a:solidFill>
+                  <a:srgbClr val="C00000"/>
+                </a:solidFill>
+              </a:rPr>
+              <a:t>理論</a:t>
+            </a:r>
+            <a:r>
+              <a:rPr kumimoji="1" lang="ja-JP" altLang="en-US"/>
+              <a:t>の専門書。</a:t>
+            </a:r>
+            <a:endParaRPr kumimoji="1" lang="en-US" altLang="ja-JP" dirty="0"/>
+          </a:p>
+          <a:p>
+            <a:pPr lvl="1"/>
+            <a:endParaRPr kumimoji="1" lang="en-US" altLang="ja-JP" dirty="0"/>
+          </a:p>
+          <a:p>
+            <a:pPr lvl="1"/>
+            <a:r>
               <a:rPr kumimoji="1" lang="en-US" altLang="ja-JP" dirty="0"/>
               <a:t>IRT</a:t>
             </a:r>
             <a:r>
               <a:rPr kumimoji="1" lang="ja-JP" altLang="en-US" dirty="0"/>
-              <a:t>の実践に精通している著者による項目反応理論の専門書。</a:t>
+              <a:t>の基本的なモデル</a:t>
+            </a:r>
+            <a:r>
+              <a:rPr kumimoji="1" lang="ja-JP" altLang="en-US"/>
+              <a:t>である</a:t>
+            </a:r>
+            <a:r>
+              <a:rPr kumimoji="1" lang="ja-JP" altLang="en-US" sz="2800" b="1"/>
+              <a:t>一次元</a:t>
+            </a:r>
+            <a:r>
+              <a:rPr kumimoji="1" lang="en-US" altLang="ja-JP" sz="2800" b="1" dirty="0"/>
+              <a:t>IRT</a:t>
+            </a:r>
+            <a:r>
+              <a:rPr kumimoji="1" lang="ja-JP" altLang="en-US" sz="2800" b="1"/>
+              <a:t>モデル</a:t>
+            </a:r>
+            <a:r>
+              <a:rPr kumimoji="1" lang="ja-JP" altLang="en-US"/>
+              <a:t>を</a:t>
+            </a:r>
+            <a:r>
+              <a:rPr kumimoji="1" lang="ja-JP" altLang="en-US" dirty="0"/>
+              <a:t>中心に，パラメタ推定，等化など，実践で必要な知識を重点的に</a:t>
+            </a:r>
+            <a:r>
+              <a:rPr kumimoji="1" lang="ja-JP" altLang="en-US"/>
+              <a:t>網羅。</a:t>
             </a:r>
             <a:endParaRPr kumimoji="1" lang="en-US" altLang="ja-JP" dirty="0"/>
           </a:p>
           <a:p>
             <a:pPr lvl="1"/>
-            <a:r>
-              <a:rPr kumimoji="1" lang="en-US" altLang="ja-JP" dirty="0"/>
-              <a:t>IRT</a:t>
-            </a:r>
-            <a:r>
-              <a:rPr kumimoji="1" lang="ja-JP" altLang="en-US" dirty="0"/>
-              <a:t>の基本的なモデルである一次元</a:t>
-            </a:r>
-            <a:r>
-              <a:rPr kumimoji="1" lang="en-US" altLang="ja-JP" dirty="0"/>
-              <a:t>IRT</a:t>
-            </a:r>
-            <a:r>
-              <a:rPr kumimoji="1" lang="ja-JP" altLang="en-US" dirty="0"/>
-              <a:t>モデルを中心に，パラメタ推定，等化など，実践で必要な知識を重点的に網羅。</a:t>
-            </a:r>
             <a:endParaRPr kumimoji="1" lang="en-US" altLang="ja-JP" dirty="0"/>
           </a:p>
           <a:p>
@@ -3634,6 +3698,36 @@
           </a:p>
         </p:txBody>
       </p:sp>
+      <p:pic>
+        <p:nvPicPr>
+          <p:cNvPr id="4" name="図 3">
+            <a:extLst>
+              <a:ext uri="{FF2B5EF4-FFF2-40B4-BE49-F238E27FC236}">
+                <a16:creationId xmlns:a16="http://schemas.microsoft.com/office/drawing/2014/main" id="{522E5D40-94FA-4B4F-B9CF-91579DBEEA1C}"/>
+              </a:ext>
+            </a:extLst>
+          </p:cNvPr>
+          <p:cNvPicPr>
+            <a:picLocks noChangeAspect="1"/>
+          </p:cNvPicPr>
+          <p:nvPr/>
+        </p:nvPicPr>
+        <p:blipFill>
+          <a:blip r:embed="rId2"/>
+          <a:stretch>
+            <a:fillRect/>
+          </a:stretch>
+        </p:blipFill>
+        <p:spPr>
+          <a:xfrm>
+            <a:off x="7164125" y="4750177"/>
+            <a:ext cx="1351225" cy="1908873"/>
+          </a:xfrm>
+          <a:prstGeom prst="rect">
+            <a:avLst/>
+          </a:prstGeom>
+        </p:spPr>
+      </p:pic>
     </p:spTree>
     <p:extLst>
       <p:ext uri="{BB962C8B-B14F-4D97-AF65-F5344CB8AC3E}">
@@ -3698,31 +3792,955 @@
           </a:p>
         </p:txBody>
       </p:sp>
-      <p:sp>
-        <p:nvSpPr>
-          <p:cNvPr id="3" name="コンテンツ プレースホルダー 2">
+      <mc:AlternateContent xmlns:mc="http://schemas.openxmlformats.org/markup-compatibility/2006">
+        <mc:Choice xmlns:a14="http://schemas.microsoft.com/office/drawing/2010/main" Requires="a14">
+          <p:sp>
+            <p:nvSpPr>
+              <p:cNvPr id="3" name="コンテンツ プレースホルダー 2">
+                <a:extLst>
+                  <a:ext uri="{FF2B5EF4-FFF2-40B4-BE49-F238E27FC236}">
+                    <a16:creationId xmlns:a16="http://schemas.microsoft.com/office/drawing/2014/main" id="{575A0F38-191F-4744-ADB8-0723B6D377DE}"/>
+                  </a:ext>
+                </a:extLst>
+              </p:cNvPr>
+              <p:cNvSpPr>
+                <a:spLocks noGrp="1"/>
+              </p:cNvSpPr>
+              <p:nvPr>
+                <p:ph idx="1"/>
+              </p:nvPr>
+            </p:nvSpPr>
+            <p:spPr/>
+            <p:txBody>
+              <a:bodyPr>
+                <a:normAutofit/>
+              </a:bodyPr>
+              <a:lstStyle/>
+              <a:p>
+                <a:r>
+                  <a:rPr kumimoji="1" lang="ja-JP" altLang="en-US" sz="2400"/>
+                  <a:t>受検者が</a:t>
+                </a:r>
+                <a:r>
+                  <a:rPr kumimoji="1" lang="ja-JP" altLang="en-US" b="1"/>
+                  <a:t>テスト</a:t>
+                </a:r>
+                <a:r>
+                  <a:rPr kumimoji="1" lang="ja-JP" altLang="en-US" sz="1600"/>
+                  <a:t>（学力検査</a:t>
+                </a:r>
+                <a:r>
+                  <a:rPr lang="en-US" altLang="ja-JP" sz="1600" dirty="0"/>
+                  <a:t>,</a:t>
+                </a:r>
+                <a:r>
+                  <a:rPr kumimoji="1" lang="ja-JP" altLang="en-US" sz="1600"/>
+                  <a:t>試験</a:t>
+                </a:r>
+                <a:r>
+                  <a:rPr kumimoji="1" lang="en-US" altLang="ja-JP" sz="1600" dirty="0"/>
+                  <a:t>,</a:t>
+                </a:r>
+                <a:r>
+                  <a:rPr kumimoji="1" lang="ja-JP" altLang="en-US" sz="1600"/>
+                  <a:t>アンケート</a:t>
+                </a:r>
+                <a:r>
+                  <a:rPr kumimoji="1" lang="en-US" altLang="ja-JP" sz="1600" dirty="0"/>
+                  <a:t>etc...</a:t>
+                </a:r>
+                <a:r>
+                  <a:rPr kumimoji="1" lang="ja-JP" altLang="en-US" sz="1600"/>
+                  <a:t>）</a:t>
+                </a:r>
+                <a:r>
+                  <a:rPr kumimoji="1" lang="ja-JP" altLang="en-US" sz="2400"/>
+                  <a:t>に回答したデータから，個人や集団の</a:t>
+                </a:r>
+                <a:r>
+                  <a:rPr kumimoji="1" lang="ja-JP" altLang="en-US" b="1"/>
+                  <a:t>潜在変数</a:t>
+                </a:r>
+                <a:r>
+                  <a:rPr kumimoji="1" lang="ja-JP" altLang="en-US" sz="1400"/>
+                  <a:t>（学力</a:t>
+                </a:r>
+                <a:r>
+                  <a:rPr kumimoji="1" lang="en-US" altLang="ja-JP" sz="1400" dirty="0"/>
+                  <a:t>, </a:t>
+                </a:r>
+                <a:r>
+                  <a:rPr kumimoji="1" lang="ja-JP" altLang="en-US" sz="1400"/>
+                  <a:t>能力</a:t>
+                </a:r>
+                <a:r>
+                  <a:rPr kumimoji="1" lang="en-US" altLang="ja-JP" sz="1400" dirty="0"/>
+                  <a:t>, </a:t>
+                </a:r>
+                <a:r>
+                  <a:rPr kumimoji="1" lang="ja-JP" altLang="en-US" sz="1400"/>
+                  <a:t>特性）</a:t>
+                </a:r>
+                <a:r>
+                  <a:rPr kumimoji="1" lang="en-US" altLang="ja-JP" sz="1400" dirty="0"/>
+                  <a:t>  </a:t>
+                </a:r>
+                <a:r>
+                  <a:rPr kumimoji="1" lang="ja-JP" altLang="en-US" sz="2400"/>
+                  <a:t>や</a:t>
+                </a:r>
+                <a:r>
+                  <a:rPr kumimoji="1" lang="ja-JP" altLang="en-US" b="1"/>
+                  <a:t>項目</a:t>
+                </a:r>
+                <a:r>
+                  <a:rPr kumimoji="1" lang="ja-JP" altLang="en-US" sz="2400"/>
+                  <a:t>自体の特性</a:t>
+                </a:r>
+                <a:r>
+                  <a:rPr lang="en-US" altLang="ja-JP" sz="1400" dirty="0"/>
+                  <a:t>(</a:t>
+                </a:r>
+                <a:r>
+                  <a:rPr lang="ja-JP" altLang="en-US" sz="1400"/>
+                  <a:t>難しさなど</a:t>
+                </a:r>
+                <a:r>
+                  <a:rPr lang="en-US" altLang="ja-JP" sz="1400" dirty="0"/>
+                  <a:t>)</a:t>
+                </a:r>
+                <a:r>
+                  <a:rPr kumimoji="1" lang="ja-JP" altLang="en-US" sz="2400"/>
+                  <a:t>を推定する。</a:t>
+                </a:r>
+                <a:endParaRPr kumimoji="1" lang="en-US" altLang="ja-JP" sz="2400" dirty="0"/>
+              </a:p>
+              <a:p>
+                <a:pPr lvl="1"/>
+                <a:r>
+                  <a:rPr kumimoji="1" lang="ja-JP" altLang="en-US" sz="2000"/>
+                  <a:t>受検者の能力</a:t>
+                </a:r>
+                <a:r>
+                  <a:rPr kumimoji="1" lang="en-US" altLang="ja-JP" sz="2000" dirty="0"/>
+                  <a:t>(</a:t>
+                </a:r>
+                <a14:m>
+                  <m:oMath xmlns:m="http://schemas.openxmlformats.org/officeDocument/2006/math">
+                    <m:r>
+                      <a:rPr kumimoji="1" lang="en-US" altLang="ja-JP" sz="2000" b="0" i="1" smtClean="0">
+                        <a:latin typeface="Cambria Math" panose="02040503050406030204" pitchFamily="18" charset="0"/>
+                      </a:rPr>
+                      <m:t>𝜃</m:t>
+                    </m:r>
+                  </m:oMath>
+                </a14:m>
+                <a:r>
+                  <a:rPr kumimoji="1" lang="en-US" altLang="ja-JP" sz="2000" dirty="0"/>
+                  <a:t>)</a:t>
+                </a:r>
+                <a:r>
+                  <a:rPr kumimoji="1" lang="ja-JP" altLang="en-US" sz="2000"/>
+                  <a:t>からテスト正答・誤答への</a:t>
+                </a:r>
+                <a:r>
+                  <a:rPr kumimoji="1" lang="en-US" altLang="ja-JP" sz="2000" dirty="0"/>
+                  <a:t>(</a:t>
+                </a:r>
+                <a:r>
+                  <a:rPr kumimoji="1" lang="ja-JP" altLang="en-US" sz="2000"/>
+                  <a:t>ロジスティック</a:t>
+                </a:r>
+                <a:r>
+                  <a:rPr kumimoji="1" lang="en-US" altLang="ja-JP" sz="2000" dirty="0"/>
+                  <a:t>)</a:t>
+                </a:r>
+                <a:r>
+                  <a:rPr kumimoji="1" lang="ja-JP" altLang="en-US" sz="2000"/>
+                  <a:t>回帰の問題に近い。</a:t>
+                </a:r>
+                <a:endParaRPr kumimoji="1" lang="ja-JP" altLang="en-US" sz="2000" dirty="0"/>
+              </a:p>
+            </p:txBody>
+          </p:sp>
+        </mc:Choice>
+        <mc:Fallback>
+          <p:sp>
+            <p:nvSpPr>
+              <p:cNvPr id="3" name="コンテンツ プレースホルダー 2">
+                <a:extLst>
+                  <a:ext uri="{FF2B5EF4-FFF2-40B4-BE49-F238E27FC236}">
+                    <a16:creationId xmlns:a16="http://schemas.microsoft.com/office/drawing/2014/main" id="{575A0F38-191F-4744-ADB8-0723B6D377DE}"/>
+                  </a:ext>
+                </a:extLst>
+              </p:cNvPr>
+              <p:cNvSpPr>
+                <a:spLocks noGrp="1" noRot="1" noChangeAspect="1" noMove="1" noResize="1" noEditPoints="1" noAdjustHandles="1" noChangeArrowheads="1" noChangeShapeType="1" noTextEdit="1"/>
+              </p:cNvSpPr>
+              <p:nvPr>
+                <p:ph idx="1"/>
+              </p:nvPr>
+            </p:nvSpPr>
+            <p:spPr>
+              <a:blipFill>
+                <a:blip r:embed="rId2"/>
+                <a:stretch>
+                  <a:fillRect l="-965" t="-1809"/>
+                </a:stretch>
+              </a:blipFill>
+            </p:spPr>
+            <p:txBody>
+              <a:bodyPr/>
+              <a:lstStyle/>
+              <a:p>
+                <a:r>
+                  <a:rPr lang="ja-JP" altLang="en-US">
+                    <a:noFill/>
+                  </a:rPr>
+                  <a:t> </a:t>
+                </a:r>
+              </a:p>
+            </p:txBody>
+          </p:sp>
+        </mc:Fallback>
+      </mc:AlternateContent>
+      <mc:AlternateContent xmlns:mc="http://schemas.openxmlformats.org/markup-compatibility/2006">
+        <mc:Choice xmlns:a14="http://schemas.microsoft.com/office/drawing/2010/main" Requires="a14">
+          <p:sp>
+            <p:nvSpPr>
+              <p:cNvPr id="11" name="テキスト ボックス 10">
+                <a:extLst>
+                  <a:ext uri="{FF2B5EF4-FFF2-40B4-BE49-F238E27FC236}">
+                    <a16:creationId xmlns:a16="http://schemas.microsoft.com/office/drawing/2014/main" id="{C6D77BC4-00EA-9445-988B-04F3C00D264E}"/>
+                  </a:ext>
+                </a:extLst>
+              </p:cNvPr>
+              <p:cNvSpPr txBox="1"/>
+              <p:nvPr/>
+            </p:nvSpPr>
+            <p:spPr>
+              <a:xfrm>
+                <a:off x="312953" y="3093524"/>
+                <a:ext cx="3620447" cy="1131785"/>
+              </a:xfrm>
+              <a:prstGeom prst="rect">
+                <a:avLst/>
+              </a:prstGeom>
+              <a:solidFill>
+                <a:schemeClr val="accent1">
+                  <a:lumMod val="40000"/>
+                  <a:lumOff val="60000"/>
+                </a:schemeClr>
+              </a:solidFill>
+              <a:ln>
+                <a:noFill/>
+              </a:ln>
+            </p:spPr>
+            <p:style>
+              <a:lnRef idx="2">
+                <a:schemeClr val="accent2"/>
+              </a:lnRef>
+              <a:fillRef idx="1">
+                <a:schemeClr val="lt1"/>
+              </a:fillRef>
+              <a:effectRef idx="0">
+                <a:schemeClr val="accent2"/>
+              </a:effectRef>
+              <a:fontRef idx="minor">
+                <a:schemeClr val="dk1"/>
+              </a:fontRef>
+            </p:style>
+            <p:txBody>
+              <a:bodyPr wrap="square" rtlCol="0">
+                <a:spAutoFit/>
+              </a:bodyPr>
+              <a:lstStyle/>
+              <a:p>
+                <a:pPr algn="ctr"/>
+                <a:r>
+                  <a:rPr lang="en-US" altLang="ja-JP" sz="2000" dirty="0"/>
+                  <a:t>2-parameter logistic </a:t>
+                </a:r>
+                <a:r>
+                  <a:rPr lang="en-US" altLang="ja-JP" sz="2000" b="1" dirty="0">
+                    <a:solidFill>
+                      <a:srgbClr val="FF0000"/>
+                    </a:solidFill>
+                  </a:rPr>
+                  <a:t>model</a:t>
+                </a:r>
+              </a:p>
+              <a:p>
+                <a:pPr algn="ctr"/>
+                <a:endParaRPr lang="en-US" altLang="ja-JP" sz="900" dirty="0"/>
+              </a:p>
+              <a:p>
+                <a:pPr algn="ctr"/>
+                <a:r>
+                  <a:rPr lang="en-US" altLang="ja-JP" sz="2400" i="1" dirty="0">
+                    <a:effectLst/>
+                    <a:ea typeface="Cambria Math" panose="020F0502020204030204" pitchFamily="34" charset="0"/>
+                  </a:rPr>
+                  <a:t>P</a:t>
+                </a:r>
+                <a14:m>
+                  <m:oMath xmlns:m="http://schemas.openxmlformats.org/officeDocument/2006/math">
+                    <m:d>
+                      <m:dPr>
+                        <m:ctrlPr>
+                          <a:rPr lang="ja-JP" altLang="ja-JP" sz="2400" i="1">
+                            <a:effectLst/>
+                            <a:latin typeface="Cambria Math" panose="02040503050406030204" pitchFamily="18" charset="0"/>
+                            <a:ea typeface="Cambria Math" panose="020F0502020204030204" pitchFamily="34" charset="0"/>
+                          </a:rPr>
+                        </m:ctrlPr>
+                      </m:dPr>
+                      <m:e>
+                        <m:r>
+                          <a:rPr lang="en-US" altLang="ja-JP" sz="2400" i="1">
+                            <a:effectLst/>
+                            <a:latin typeface="Cambria Math" panose="020F0502020204030204" pitchFamily="34" charset="0"/>
+                            <a:ea typeface="游明朝" panose="020B0604020202020204" pitchFamily="34" charset="0"/>
+                            <a:cs typeface="Times New Roman" panose="020F0502020204030204" pitchFamily="34" charset="0"/>
+                          </a:rPr>
+                          <m:t>𝜃</m:t>
+                        </m:r>
+                      </m:e>
+                    </m:d>
+                    <m:r>
+                      <a:rPr lang="en-US" altLang="ja-JP" sz="2400">
+                        <a:effectLst/>
+                        <a:latin typeface="Cambria Math" panose="020F0502020204030204" pitchFamily="34" charset="0"/>
+                        <a:ea typeface="游明朝" panose="020B0604020202020204" pitchFamily="34" charset="0"/>
+                        <a:cs typeface="Times New Roman" panose="020F0502020204030204" pitchFamily="34" charset="0"/>
+                      </a:rPr>
+                      <m:t>=</m:t>
+                    </m:r>
+                    <m:f>
+                      <m:fPr>
+                        <m:ctrlPr>
+                          <a:rPr lang="ja-JP" altLang="ja-JP" sz="2400" i="1">
+                            <a:effectLst/>
+                            <a:latin typeface="Cambria Math" panose="02040503050406030204" pitchFamily="18" charset="0"/>
+                            <a:ea typeface="Cambria Math" panose="020F0502020204030204" pitchFamily="34" charset="0"/>
+                          </a:rPr>
+                        </m:ctrlPr>
+                      </m:fPr>
+                      <m:num>
+                        <m:r>
+                          <a:rPr lang="en-US" altLang="ja-JP" sz="2400">
+                            <a:effectLst/>
+                            <a:latin typeface="Cambria Math" panose="020F0502020204030204" pitchFamily="34" charset="0"/>
+                            <a:ea typeface="游明朝" panose="020B0604020202020204" pitchFamily="34" charset="0"/>
+                            <a:cs typeface="Times New Roman" panose="020F0502020204030204" pitchFamily="34" charset="0"/>
+                          </a:rPr>
+                          <m:t>1</m:t>
+                        </m:r>
+                      </m:num>
+                      <m:den>
+                        <m:r>
+                          <a:rPr lang="en-US" altLang="ja-JP" sz="2400" i="1">
+                            <a:effectLst/>
+                            <a:latin typeface="Cambria Math" panose="020F0502020204030204" pitchFamily="34" charset="0"/>
+                            <a:ea typeface="游明朝" panose="020B0604020202020204" pitchFamily="34" charset="0"/>
+                            <a:cs typeface="Times New Roman" panose="020F0502020204030204" pitchFamily="34" charset="0"/>
+                          </a:rPr>
+                          <m:t>1+</m:t>
+                        </m:r>
+                        <m:func>
+                          <m:funcPr>
+                            <m:ctrlPr>
+                              <a:rPr lang="ja-JP" altLang="ja-JP" sz="2400" i="1">
+                                <a:effectLst/>
+                                <a:latin typeface="Cambria Math" panose="02040503050406030204" pitchFamily="18" charset="0"/>
+                                <a:ea typeface="Cambria Math" panose="020F0502020204030204" pitchFamily="34" charset="0"/>
+                              </a:rPr>
+                            </m:ctrlPr>
+                          </m:funcPr>
+                          <m:fName>
+                            <m:r>
+                              <m:rPr>
+                                <m:sty m:val="p"/>
+                              </m:rPr>
+                              <a:rPr lang="en-US" altLang="ja-JP" sz="2400">
+                                <a:effectLst/>
+                                <a:latin typeface="Cambria Math" panose="020F0502020204030204" pitchFamily="34" charset="0"/>
+                                <a:ea typeface="游明朝" panose="020B0604020202020204" pitchFamily="34" charset="0"/>
+                                <a:cs typeface="Times New Roman" panose="020F0502020204030204" pitchFamily="34" charset="0"/>
+                              </a:rPr>
+                              <m:t>exp</m:t>
+                            </m:r>
+                          </m:fName>
+                          <m:e>
+                            <m:d>
+                              <m:dPr>
+                                <m:ctrlPr>
+                                  <a:rPr lang="ja-JP" altLang="ja-JP" sz="2400" i="1">
+                                    <a:effectLst/>
+                                    <a:latin typeface="Cambria Math" panose="02040503050406030204" pitchFamily="18" charset="0"/>
+                                    <a:ea typeface="Cambria Math" panose="020F0502020204030204" pitchFamily="34" charset="0"/>
+                                  </a:rPr>
+                                </m:ctrlPr>
+                              </m:dPr>
+                              <m:e>
+                                <m:r>
+                                  <a:rPr lang="en-US" altLang="ja-JP" sz="2400" i="1">
+                                    <a:effectLst/>
+                                    <a:latin typeface="Cambria Math" panose="020F0502020204030204" pitchFamily="34" charset="0"/>
+                                    <a:ea typeface="游明朝" panose="020B0604020202020204" pitchFamily="34" charset="0"/>
+                                    <a:cs typeface="Times New Roman" panose="020F0502020204030204" pitchFamily="34" charset="0"/>
+                                  </a:rPr>
+                                  <m:t>−</m:t>
+                                </m:r>
+                                <m:r>
+                                  <a:rPr lang="en-US" altLang="ja-JP" sz="2400" b="1" i="1" smtClean="0">
+                                    <a:solidFill>
+                                      <a:srgbClr val="FF0000"/>
+                                    </a:solidFill>
+                                    <a:effectLst/>
+                                    <a:latin typeface="Cambria Math" panose="02040503050406030204" pitchFamily="18" charset="0"/>
+                                    <a:ea typeface="游明朝" panose="020B0604020202020204" pitchFamily="34" charset="0"/>
+                                    <a:cs typeface="Times New Roman" panose="020F0502020204030204" pitchFamily="34" charset="0"/>
+                                  </a:rPr>
+                                  <m:t>𝒂</m:t>
+                                </m:r>
+                                <m:d>
+                                  <m:dPr>
+                                    <m:ctrlPr>
+                                      <a:rPr lang="ja-JP" altLang="ja-JP" sz="2400" i="1">
+                                        <a:effectLst/>
+                                        <a:latin typeface="Cambria Math" panose="02040503050406030204" pitchFamily="18" charset="0"/>
+                                        <a:ea typeface="Cambria Math" panose="020F0502020204030204" pitchFamily="34" charset="0"/>
+                                      </a:rPr>
+                                    </m:ctrlPr>
+                                  </m:dPr>
+                                  <m:e>
+                                    <m:r>
+                                      <a:rPr lang="en-US" altLang="ja-JP" sz="2400" b="1" i="1" smtClean="0">
+                                        <a:solidFill>
+                                          <a:srgbClr val="FF0000"/>
+                                        </a:solidFill>
+                                        <a:effectLst/>
+                                        <a:latin typeface="Cambria Math" panose="020F0502020204030204" pitchFamily="34" charset="0"/>
+                                        <a:ea typeface="游明朝" panose="020B0604020202020204" pitchFamily="34" charset="0"/>
+                                        <a:cs typeface="Times New Roman" panose="020F0502020204030204" pitchFamily="34" charset="0"/>
+                                      </a:rPr>
+                                      <m:t>𝜽</m:t>
+                                    </m:r>
+                                    <m:r>
+                                      <a:rPr lang="en-US" altLang="ja-JP" sz="2400" i="1">
+                                        <a:effectLst/>
+                                        <a:latin typeface="Cambria Math" panose="020F0502020204030204" pitchFamily="34" charset="0"/>
+                                        <a:ea typeface="游明朝" panose="020B0604020202020204" pitchFamily="34" charset="0"/>
+                                        <a:cs typeface="Times New Roman" panose="020F0502020204030204" pitchFamily="34" charset="0"/>
+                                      </a:rPr>
+                                      <m:t>−</m:t>
+                                    </m:r>
+                                    <m:r>
+                                      <a:rPr lang="en-US" altLang="ja-JP" sz="2400" b="1" i="1" smtClean="0">
+                                        <a:solidFill>
+                                          <a:srgbClr val="FF0000"/>
+                                        </a:solidFill>
+                                        <a:effectLst/>
+                                        <a:latin typeface="Cambria Math" panose="02040503050406030204" pitchFamily="18" charset="0"/>
+                                        <a:ea typeface="游明朝" panose="020B0604020202020204" pitchFamily="34" charset="0"/>
+                                        <a:cs typeface="Times New Roman" panose="020F0502020204030204" pitchFamily="34" charset="0"/>
+                                      </a:rPr>
+                                      <m:t>𝒃</m:t>
+                                    </m:r>
+                                  </m:e>
+                                </m:d>
+                              </m:e>
+                            </m:d>
+                          </m:e>
+                        </m:func>
+                      </m:den>
+                    </m:f>
+                  </m:oMath>
+                </a14:m>
+                <a:r>
+                  <a:rPr lang="ja-JP" altLang="ja-JP" sz="1600">
+                    <a:effectLst/>
+                  </a:rPr>
+                  <a:t> </a:t>
+                </a:r>
+                <a:endParaRPr lang="en-US" altLang="ja-JP" sz="1600" dirty="0">
+                  <a:effectLst/>
+                </a:endParaRPr>
+              </a:p>
+            </p:txBody>
+          </p:sp>
+        </mc:Choice>
+        <mc:Fallback>
+          <p:sp>
+            <p:nvSpPr>
+              <p:cNvPr id="11" name="テキスト ボックス 10">
+                <a:extLst>
+                  <a:ext uri="{FF2B5EF4-FFF2-40B4-BE49-F238E27FC236}">
+                    <a16:creationId xmlns:a16="http://schemas.microsoft.com/office/drawing/2014/main" id="{C6D77BC4-00EA-9445-988B-04F3C00D264E}"/>
+                  </a:ext>
+                </a:extLst>
+              </p:cNvPr>
+              <p:cNvSpPr txBox="1">
+                <a:spLocks noRot="1" noChangeAspect="1" noMove="1" noResize="1" noEditPoints="1" noAdjustHandles="1" noChangeArrowheads="1" noChangeShapeType="1" noTextEdit="1"/>
+              </p:cNvSpPr>
+              <p:nvPr/>
+            </p:nvSpPr>
+            <p:spPr>
+              <a:xfrm>
+                <a:off x="312953" y="3093524"/>
+                <a:ext cx="3620447" cy="1131785"/>
+              </a:xfrm>
+              <a:prstGeom prst="rect">
+                <a:avLst/>
+              </a:prstGeom>
+              <a:blipFill>
+                <a:blip r:embed="rId3"/>
+                <a:stretch>
+                  <a:fillRect l="-1399" t="-3333" r="-1049"/>
+                </a:stretch>
+              </a:blipFill>
+              <a:ln>
+                <a:noFill/>
+              </a:ln>
+            </p:spPr>
+            <p:txBody>
+              <a:bodyPr/>
+              <a:lstStyle/>
+              <a:p>
+                <a:r>
+                  <a:rPr lang="ja-JP" altLang="en-US">
+                    <a:noFill/>
+                  </a:rPr>
+                  <a:t> </a:t>
+                </a:r>
+              </a:p>
+            </p:txBody>
+          </p:sp>
+        </mc:Fallback>
+      </mc:AlternateContent>
+      <mc:AlternateContent xmlns:mc="http://schemas.openxmlformats.org/markup-compatibility/2006">
+        <mc:Choice xmlns:a14="http://schemas.microsoft.com/office/drawing/2010/main" Requires="a14">
+          <p:sp>
+            <p:nvSpPr>
+              <p:cNvPr id="12" name="テキスト ボックス 11">
+                <a:extLst>
+                  <a:ext uri="{FF2B5EF4-FFF2-40B4-BE49-F238E27FC236}">
+                    <a16:creationId xmlns:a16="http://schemas.microsoft.com/office/drawing/2014/main" id="{C55D2E99-7AAB-8D4C-98B2-F76D696E18F0}"/>
+                  </a:ext>
+                </a:extLst>
+              </p:cNvPr>
+              <p:cNvSpPr txBox="1"/>
+              <p:nvPr/>
+            </p:nvSpPr>
+            <p:spPr>
+              <a:xfrm>
+                <a:off x="1015270" y="4257778"/>
+                <a:ext cx="2318787" cy="1077218"/>
+              </a:xfrm>
+              <a:prstGeom prst="rect">
+                <a:avLst/>
+              </a:prstGeom>
+              <a:noFill/>
+            </p:spPr>
+            <p:txBody>
+              <a:bodyPr wrap="square" rtlCol="0" anchor="ctr">
+                <a:spAutoFit/>
+              </a:bodyPr>
+              <a:lstStyle/>
+              <a:p>
+                <a:r>
+                  <a:rPr lang="en-US" altLang="ja-JP" sz="1600" i="1" dirty="0"/>
+                  <a:t>P</a:t>
+                </a:r>
+                <a:r>
+                  <a:rPr lang="en-US" altLang="ja-JP" sz="1600" dirty="0"/>
+                  <a:t>…</a:t>
+                </a:r>
+                <a:r>
+                  <a:rPr lang="ja-JP" altLang="en-US" sz="1600" dirty="0"/>
+                  <a:t>正答確率</a:t>
+                </a:r>
+                <a:endParaRPr lang="en-US" altLang="ja-JP" sz="1600" dirty="0"/>
+              </a:p>
+              <a:p>
+                <a14:m>
+                  <m:oMath xmlns:m="http://schemas.openxmlformats.org/officeDocument/2006/math">
+                    <m:r>
+                      <a:rPr lang="en-US" altLang="ja-JP" sz="1600" b="1" i="1" smtClean="0">
+                        <a:latin typeface="Cambria Math" panose="02040503050406030204" pitchFamily="18" charset="0"/>
+                      </a:rPr>
+                      <m:t>𝜽</m:t>
+                    </m:r>
+                  </m:oMath>
+                </a14:m>
+                <a:r>
+                  <a:rPr lang="en-US" altLang="ja-JP" sz="1600" dirty="0"/>
+                  <a:t>…</a:t>
+                </a:r>
+                <a:r>
+                  <a:rPr lang="ja-JP" altLang="en-US" sz="1600" dirty="0"/>
+                  <a:t>受検者の</a:t>
+                </a:r>
+                <a:r>
+                  <a:rPr lang="ja-JP" altLang="en-US" sz="1600" b="1" dirty="0"/>
+                  <a:t>能力</a:t>
+                </a:r>
+                <a:endParaRPr lang="en-US" altLang="ja-JP" sz="1600" b="1" dirty="0"/>
+              </a:p>
+              <a:p>
+                <a:r>
+                  <a:rPr lang="en-US" altLang="ja-JP" sz="1600" b="1" i="1" dirty="0"/>
+                  <a:t>b</a:t>
+                </a:r>
+                <a:r>
+                  <a:rPr lang="en-US" altLang="ja-JP" sz="1600" dirty="0"/>
+                  <a:t>…</a:t>
+                </a:r>
+                <a:r>
+                  <a:rPr lang="ja-JP" altLang="en-US" sz="1600" dirty="0"/>
+                  <a:t>項目</a:t>
+                </a:r>
+                <a:r>
+                  <a:rPr lang="ja-JP" altLang="en-US" sz="1600" b="1" dirty="0"/>
+                  <a:t>困難度</a:t>
+                </a:r>
+                <a:endParaRPr lang="en-US" altLang="ja-JP" sz="1600" b="1" dirty="0"/>
+              </a:p>
+              <a:p>
+                <a:r>
+                  <a:rPr lang="en-US" altLang="ja-JP" sz="1600" b="1" i="1" dirty="0"/>
+                  <a:t>a</a:t>
+                </a:r>
+                <a:r>
+                  <a:rPr lang="en-US" altLang="ja-JP" sz="1600" dirty="0"/>
+                  <a:t>…</a:t>
+                </a:r>
+                <a:r>
+                  <a:rPr lang="ja-JP" altLang="en-US" sz="1600" dirty="0"/>
+                  <a:t>項目</a:t>
+                </a:r>
+                <a:r>
+                  <a:rPr lang="ja-JP" altLang="en-US" sz="1600" b="1" dirty="0"/>
+                  <a:t>識別力</a:t>
+                </a:r>
+              </a:p>
+            </p:txBody>
+          </p:sp>
+        </mc:Choice>
+        <mc:Fallback>
+          <p:sp>
+            <p:nvSpPr>
+              <p:cNvPr id="12" name="テキスト ボックス 11">
+                <a:extLst>
+                  <a:ext uri="{FF2B5EF4-FFF2-40B4-BE49-F238E27FC236}">
+                    <a16:creationId xmlns:a16="http://schemas.microsoft.com/office/drawing/2014/main" id="{C55D2E99-7AAB-8D4C-98B2-F76D696E18F0}"/>
+                  </a:ext>
+                </a:extLst>
+              </p:cNvPr>
+              <p:cNvSpPr txBox="1">
+                <a:spLocks noRot="1" noChangeAspect="1" noMove="1" noResize="1" noEditPoints="1" noAdjustHandles="1" noChangeArrowheads="1" noChangeShapeType="1" noTextEdit="1"/>
+              </p:cNvSpPr>
+              <p:nvPr/>
+            </p:nvSpPr>
+            <p:spPr>
+              <a:xfrm>
+                <a:off x="1015270" y="4257778"/>
+                <a:ext cx="2318787" cy="1077218"/>
+              </a:xfrm>
+              <a:prstGeom prst="rect">
+                <a:avLst/>
+              </a:prstGeom>
+              <a:blipFill>
+                <a:blip r:embed="rId4"/>
+                <a:stretch>
+                  <a:fillRect l="-1087" t="-2326" b="-8140"/>
+                </a:stretch>
+              </a:blipFill>
+            </p:spPr>
+            <p:txBody>
+              <a:bodyPr/>
+              <a:lstStyle/>
+              <a:p>
+                <a:r>
+                  <a:rPr lang="ja-JP" altLang="en-US">
+                    <a:noFill/>
+                  </a:rPr>
+                  <a:t> </a:t>
+                </a:r>
+              </a:p>
+            </p:txBody>
+          </p:sp>
+        </mc:Fallback>
+      </mc:AlternateContent>
+      <p:sp>
+        <p:nvSpPr>
+          <p:cNvPr id="13" name="角丸四角形 24">
             <a:extLst>
               <a:ext uri="{FF2B5EF4-FFF2-40B4-BE49-F238E27FC236}">
-                <a16:creationId xmlns:a16="http://schemas.microsoft.com/office/drawing/2014/main" id="{575A0F38-191F-4744-ADB8-0723B6D377DE}"/>
+                <a16:creationId xmlns:a16="http://schemas.microsoft.com/office/drawing/2014/main" id="{EEABCE51-C9DE-E943-B982-476A60C346E5}"/>
               </a:ext>
             </a:extLst>
           </p:cNvPr>
-          <p:cNvSpPr>
-            <a:spLocks noGrp="1"/>
-          </p:cNvSpPr>
-          <p:nvPr>
-            <p:ph idx="1"/>
-          </p:nvPr>
-        </p:nvSpPr>
-        <p:spPr/>
-        <p:txBody>
-          <a:bodyPr/>
-          <a:lstStyle/>
-          <a:p>
-            <a:endParaRPr kumimoji="1" lang="ja-JP" altLang="en-US" dirty="0"/>
-          </a:p>
-        </p:txBody>
-      </p:sp>
+          <p:cNvSpPr/>
+          <p:nvPr/>
+        </p:nvSpPr>
+        <p:spPr>
+          <a:xfrm>
+            <a:off x="331443" y="5454179"/>
+            <a:ext cx="8482609" cy="1197182"/>
+          </a:xfrm>
+          <a:prstGeom prst="roundRect">
+            <a:avLst>
+              <a:gd name="adj" fmla="val 8513"/>
+            </a:avLst>
+          </a:prstGeom>
+          <a:solidFill>
+            <a:schemeClr val="tx1">
+              <a:lumMod val="75000"/>
+              <a:lumOff val="25000"/>
+            </a:schemeClr>
+          </a:solidFill>
+          <a:ln>
+            <a:noFill/>
+          </a:ln>
+        </p:spPr>
+        <p:style>
+          <a:lnRef idx="2">
+            <a:schemeClr val="dk1">
+              <a:shade val="50000"/>
+            </a:schemeClr>
+          </a:lnRef>
+          <a:fillRef idx="1">
+            <a:schemeClr val="dk1"/>
+          </a:fillRef>
+          <a:effectRef idx="0">
+            <a:schemeClr val="dk1"/>
+          </a:effectRef>
+          <a:fontRef idx="minor">
+            <a:schemeClr val="lt1"/>
+          </a:fontRef>
+        </p:style>
+        <p:txBody>
+          <a:bodyPr rtlCol="0" anchor="ctr"/>
+          <a:lstStyle/>
+          <a:p>
+            <a:pPr algn="ctr"/>
+            <a:r>
+              <a:rPr kumimoji="1" lang="ja-JP" altLang="en-US" sz="2800" dirty="0"/>
+              <a:t>テストへの回答の背後にある</a:t>
+            </a:r>
+            <a:r>
+              <a:rPr kumimoji="1" lang="ja-JP" altLang="en-US" sz="3200" b="1" dirty="0"/>
+              <a:t>能力</a:t>
+            </a:r>
+            <a:r>
+              <a:rPr kumimoji="1" lang="ja-JP" altLang="en-US" sz="2800" dirty="0"/>
+              <a:t>を</a:t>
+            </a:r>
+            <a:endParaRPr kumimoji="1" lang="en-US" altLang="ja-JP" sz="2800" dirty="0"/>
+          </a:p>
+          <a:p>
+            <a:pPr algn="ctr"/>
+            <a:r>
+              <a:rPr kumimoji="1" lang="ja-JP" altLang="en-US" sz="3200" b="1" dirty="0">
+                <a:solidFill>
+                  <a:srgbClr val="FF0000"/>
+                </a:solidFill>
+              </a:rPr>
+              <a:t>モデリング</a:t>
+            </a:r>
+            <a:r>
+              <a:rPr kumimoji="1" lang="ja-JP" altLang="en-US" sz="2800" dirty="0"/>
+              <a:t>（数式で表現）する</a:t>
+            </a:r>
+            <a:endParaRPr kumimoji="1" lang="en" altLang="ja-JP" sz="2800" dirty="0"/>
+          </a:p>
+        </p:txBody>
+      </p:sp>
+      <p:sp>
+        <p:nvSpPr>
+          <p:cNvPr id="14" name="角丸四角形 13">
+            <a:extLst>
+              <a:ext uri="{FF2B5EF4-FFF2-40B4-BE49-F238E27FC236}">
+                <a16:creationId xmlns:a16="http://schemas.microsoft.com/office/drawing/2014/main" id="{7FB27F20-2964-6540-AD5E-85A22CA37506}"/>
+              </a:ext>
+            </a:extLst>
+          </p:cNvPr>
+          <p:cNvSpPr/>
+          <p:nvPr/>
+        </p:nvSpPr>
+        <p:spPr>
+          <a:xfrm>
+            <a:off x="1015271" y="4514190"/>
+            <a:ext cx="1734458" cy="793106"/>
+          </a:xfrm>
+          <a:prstGeom prst="roundRect">
+            <a:avLst>
+              <a:gd name="adj" fmla="val 6553"/>
+            </a:avLst>
+          </a:prstGeom>
+          <a:noFill/>
+          <a:ln w="28575">
+            <a:solidFill>
+              <a:srgbClr val="FF0000"/>
+            </a:solidFill>
+            <a:prstDash val="sysDash"/>
+          </a:ln>
+        </p:spPr>
+        <p:style>
+          <a:lnRef idx="2">
+            <a:schemeClr val="accent1">
+              <a:shade val="50000"/>
+            </a:schemeClr>
+          </a:lnRef>
+          <a:fillRef idx="1">
+            <a:schemeClr val="accent1"/>
+          </a:fillRef>
+          <a:effectRef idx="0">
+            <a:schemeClr val="accent1"/>
+          </a:effectRef>
+          <a:fontRef idx="minor">
+            <a:schemeClr val="lt1"/>
+          </a:fontRef>
+        </p:style>
+        <p:txBody>
+          <a:bodyPr rtlCol="0" anchor="ctr"/>
+          <a:lstStyle/>
+          <a:p>
+            <a:pPr algn="ctr"/>
+            <a:endParaRPr kumimoji="1" lang="ja-JP" altLang="en-US"/>
+          </a:p>
+        </p:txBody>
+      </p:sp>
+      <p:sp>
+        <p:nvSpPr>
+          <p:cNvPr id="15" name="テキスト ボックス 14">
+            <a:extLst>
+              <a:ext uri="{FF2B5EF4-FFF2-40B4-BE49-F238E27FC236}">
+                <a16:creationId xmlns:a16="http://schemas.microsoft.com/office/drawing/2014/main" id="{5D642924-1BAB-A648-9151-D2AD6C0F38ED}"/>
+              </a:ext>
+            </a:extLst>
+          </p:cNvPr>
+          <p:cNvSpPr txBox="1"/>
+          <p:nvPr/>
+        </p:nvSpPr>
+        <p:spPr>
+          <a:xfrm>
+            <a:off x="3048430" y="4309609"/>
+            <a:ext cx="1363016" cy="707886"/>
+          </a:xfrm>
+          <a:prstGeom prst="rect">
+            <a:avLst/>
+          </a:prstGeom>
+          <a:noFill/>
+        </p:spPr>
+        <p:txBody>
+          <a:bodyPr wrap="square" rtlCol="0">
+            <a:spAutoFit/>
+          </a:bodyPr>
+          <a:lstStyle/>
+          <a:p>
+            <a:r>
+              <a:rPr kumimoji="1" lang="ja-JP" altLang="en-US" sz="2000" dirty="0"/>
+              <a:t>知りたい</a:t>
+            </a:r>
+            <a:endParaRPr kumimoji="1" lang="en-US" altLang="ja-JP" sz="2000" dirty="0"/>
+          </a:p>
+          <a:p>
+            <a:r>
+              <a:rPr kumimoji="1" lang="ja-JP" altLang="en-US" sz="2000" b="1" dirty="0"/>
+              <a:t>パラメタ</a:t>
+            </a:r>
+          </a:p>
+        </p:txBody>
+      </p:sp>
+      <p:sp>
+        <p:nvSpPr>
+          <p:cNvPr id="16" name="吹き出し: 角を丸めた四角形 9">
+            <a:extLst>
+              <a:ext uri="{FF2B5EF4-FFF2-40B4-BE49-F238E27FC236}">
+                <a16:creationId xmlns:a16="http://schemas.microsoft.com/office/drawing/2014/main" id="{E9ADA924-7939-A24B-917A-C3275AD51F2B}"/>
+              </a:ext>
+            </a:extLst>
+          </p:cNvPr>
+          <p:cNvSpPr/>
+          <p:nvPr/>
+        </p:nvSpPr>
+        <p:spPr>
+          <a:xfrm>
+            <a:off x="3032175" y="4248123"/>
+            <a:ext cx="1229920" cy="793106"/>
+          </a:xfrm>
+          <a:prstGeom prst="wedgeRoundRectCallout">
+            <a:avLst>
+              <a:gd name="adj1" fmla="val -47227"/>
+              <a:gd name="adj2" fmla="val 61175"/>
+              <a:gd name="adj3" fmla="val 16667"/>
+            </a:avLst>
+          </a:prstGeom>
+          <a:noFill/>
+          <a:ln w="19050">
+            <a:solidFill>
+              <a:schemeClr val="tx1"/>
+            </a:solidFill>
+          </a:ln>
+        </p:spPr>
+        <p:style>
+          <a:lnRef idx="2">
+            <a:schemeClr val="accent1">
+              <a:shade val="50000"/>
+            </a:schemeClr>
+          </a:lnRef>
+          <a:fillRef idx="1">
+            <a:schemeClr val="accent1"/>
+          </a:fillRef>
+          <a:effectRef idx="0">
+            <a:schemeClr val="accent1"/>
+          </a:effectRef>
+          <a:fontRef idx="minor">
+            <a:schemeClr val="lt1"/>
+          </a:fontRef>
+        </p:style>
+        <p:txBody>
+          <a:bodyPr rtlCol="0" anchor="ctr"/>
+          <a:lstStyle/>
+          <a:p>
+            <a:pPr algn="ctr"/>
+            <a:endParaRPr kumimoji="1" lang="ja-JP" altLang="en-US"/>
+          </a:p>
+        </p:txBody>
+      </p:sp>
+      <p:pic>
+        <p:nvPicPr>
+          <p:cNvPr id="17" name="図 16" descr="テキスト, 地図 が含まれている画像&#10;&#10;自動的に生成された説明">
+            <a:extLst>
+              <a:ext uri="{FF2B5EF4-FFF2-40B4-BE49-F238E27FC236}">
+                <a16:creationId xmlns:a16="http://schemas.microsoft.com/office/drawing/2014/main" id="{DEE3C654-CBF0-E84C-9D20-44C54CED5554}"/>
+              </a:ext>
+            </a:extLst>
+          </p:cNvPr>
+          <p:cNvPicPr>
+            <a:picLocks noChangeAspect="1"/>
+          </p:cNvPicPr>
+          <p:nvPr/>
+        </p:nvPicPr>
+        <p:blipFill>
+          <a:blip r:embed="rId5"/>
+          <a:stretch>
+            <a:fillRect/>
+          </a:stretch>
+        </p:blipFill>
+        <p:spPr>
+          <a:xfrm>
+            <a:off x="4307600" y="3093524"/>
+            <a:ext cx="4483671" cy="3202622"/>
+          </a:xfrm>
+          <a:prstGeom prst="rect">
+            <a:avLst/>
+          </a:prstGeom>
+        </p:spPr>
+      </p:pic>
     </p:spTree>
     <p:extLst>
       <p:ext uri="{BB962C8B-B14F-4D97-AF65-F5344CB8AC3E}">
@@ -3776,6 +4794,10 @@
           </a:bodyPr>
           <a:lstStyle/>
           <a:p>
+            <a:r>
+              <a:rPr kumimoji="1" lang="ja-JP" altLang="en-US"/>
+              <a:t>こんなひとにおすすめ</a:t>
+            </a:r>
             <a:endParaRPr kumimoji="1" lang="ja-JP" altLang="en-US" dirty="0"/>
           </a:p>
         </p:txBody>
@@ -3800,6 +4822,48 @@
         <p:txBody>
           <a:bodyPr/>
           <a:lstStyle/>
+          <a:p>
+            <a:r>
+              <a:rPr kumimoji="1" lang="ja-JP" altLang="en-US"/>
+              <a:t>目に見えない特性や傾向を測定したい</a:t>
+            </a:r>
+            <a:endParaRPr kumimoji="1" lang="en-US" altLang="ja-JP" dirty="0"/>
+          </a:p>
+          <a:p>
+            <a:r>
+              <a:rPr lang="ja-JP" altLang="en-US"/>
+              <a:t>心理尺度や学力測定のための尺度を作成したい</a:t>
+            </a:r>
+            <a:endParaRPr lang="en-US" altLang="ja-JP" dirty="0"/>
+          </a:p>
+          <a:p>
+            <a:pPr lvl="1"/>
+            <a:r>
+              <a:rPr kumimoji="1" lang="en-US" altLang="ja-JP" dirty="0"/>
+              <a:t>IRT</a:t>
+            </a:r>
+            <a:r>
+              <a:rPr kumimoji="1" lang="ja-JP" altLang="en-US"/>
+              <a:t>はもともとテストに特化した心理計量モデルです</a:t>
+            </a:r>
+            <a:r>
+              <a:rPr kumimoji="1" lang="en-US" altLang="ja-JP" dirty="0"/>
+              <a:t>(SEM</a:t>
+            </a:r>
+            <a:r>
+              <a:rPr kumimoji="1" lang="ja-JP" altLang="en-US"/>
+              <a:t>や因子分析と一緒に語られることもありますが</a:t>
+            </a:r>
+            <a:r>
+              <a:rPr kumimoji="1" lang="en-US" altLang="ja-JP" dirty="0"/>
+              <a:t>)</a:t>
+            </a:r>
+            <a:r>
+              <a:rPr kumimoji="1" lang="ja-JP" altLang="en-US"/>
+              <a:t>。</a:t>
+            </a:r>
+            <a:endParaRPr kumimoji="1" lang="en-US" altLang="ja-JP"/>
+          </a:p>
           <a:p>
             <a:endParaRPr kumimoji="1" lang="ja-JP" altLang="en-US"/>
           </a:p>

</xml_diff>